<commit_message>
probably trying to switch back to coding the UI instead of using FXML
</commit_message>
<xml_diff>
--- a/mockup.pptx
+++ b/mockup.pptx
@@ -124,6 +124,234 @@
 </p:presentation>
 </file>
 
+<file path=ppt/revisionInfo.xml><?xml version="1.0" encoding="utf-8"?>
+<p1510:revInfo xmlns:a="http://schemas.openxmlformats.org/drawingml/2006/main" xmlns:r="http://schemas.openxmlformats.org/officeDocument/2006/relationships" xmlns:p1510="http://schemas.microsoft.com/office/powerpoint/2015/10/main">
+  <p1510:revLst>
+    <p1510:client id="{B1AFB909-1AD8-4EC8-A985-718099B00839}" v="12" dt="2023-01-16T13:31:01.259"/>
+  </p1510:revLst>
+</p1510:revInfo>
+</file>
+
+<file path=ppt/changesInfos/changesInfo1.xml><?xml version="1.0" encoding="utf-8"?>
+<pc:chgInfo xmlns:a="http://schemas.openxmlformats.org/drawingml/2006/main" xmlns:r="http://schemas.openxmlformats.org/officeDocument/2006/relationships" xmlns:ac="http://schemas.microsoft.com/office/drawing/2013/main/command" xmlns:pc="http://schemas.microsoft.com/office/powerpoint/2013/main/command">
+  <pc:docChgLst>
+    <pc:chgData name="Felix Gervasi" userId="af4e32ee5822202e" providerId="LiveId" clId="{B1AFB909-1AD8-4EC8-A985-718099B00839}"/>
+    <pc:docChg chg="custSel modSld">
+      <pc:chgData name="Felix Gervasi" userId="af4e32ee5822202e" providerId="LiveId" clId="{B1AFB909-1AD8-4EC8-A985-718099B00839}" dt="2023-01-16T13:31:15.929" v="191" actId="1076"/>
+      <pc:docMkLst>
+        <pc:docMk/>
+      </pc:docMkLst>
+      <pc:sldChg chg="addSp modSp mod">
+        <pc:chgData name="Felix Gervasi" userId="af4e32ee5822202e" providerId="LiveId" clId="{B1AFB909-1AD8-4EC8-A985-718099B00839}" dt="2023-01-16T13:22:20.683" v="33" actId="14100"/>
+        <pc:sldMkLst>
+          <pc:docMk/>
+          <pc:sldMk cId="2703526222" sldId="256"/>
+        </pc:sldMkLst>
+        <pc:spChg chg="add mod">
+          <ac:chgData name="Felix Gervasi" userId="af4e32ee5822202e" providerId="LiveId" clId="{B1AFB909-1AD8-4EC8-A985-718099B00839}" dt="2023-01-16T13:22:20.683" v="33" actId="14100"/>
+          <ac:spMkLst>
+            <pc:docMk/>
+            <pc:sldMk cId="2703526222" sldId="256"/>
+            <ac:spMk id="2" creationId="{535A1B05-2131-54AC-5ACF-DD7AB03D58A2}"/>
+          </ac:spMkLst>
+        </pc:spChg>
+        <pc:spChg chg="add mod">
+          <ac:chgData name="Felix Gervasi" userId="af4e32ee5822202e" providerId="LiveId" clId="{B1AFB909-1AD8-4EC8-A985-718099B00839}" dt="2023-01-16T13:22:12.404" v="31" actId="207"/>
+          <ac:spMkLst>
+            <pc:docMk/>
+            <pc:sldMk cId="2703526222" sldId="256"/>
+            <ac:spMk id="3" creationId="{B1B5887A-B30F-5227-8A15-B56921457587}"/>
+          </ac:spMkLst>
+        </pc:spChg>
+        <pc:spChg chg="mod">
+          <ac:chgData name="Felix Gervasi" userId="af4e32ee5822202e" providerId="LiveId" clId="{B1AFB909-1AD8-4EC8-A985-718099B00839}" dt="2023-01-16T13:21:30.548" v="0" actId="1076"/>
+          <ac:spMkLst>
+            <pc:docMk/>
+            <pc:sldMk cId="2703526222" sldId="256"/>
+            <ac:spMk id="6" creationId="{4A1C5534-9417-DD01-DB9C-AEEDB8350743}"/>
+          </ac:spMkLst>
+        </pc:spChg>
+        <pc:spChg chg="mod">
+          <ac:chgData name="Felix Gervasi" userId="af4e32ee5822202e" providerId="LiveId" clId="{B1AFB909-1AD8-4EC8-A985-718099B00839}" dt="2023-01-16T13:21:30.548" v="0" actId="1076"/>
+          <ac:spMkLst>
+            <pc:docMk/>
+            <pc:sldMk cId="2703526222" sldId="256"/>
+            <ac:spMk id="7" creationId="{C5C55DC0-CF2C-690D-89C9-88A99DA5377D}"/>
+          </ac:spMkLst>
+        </pc:spChg>
+        <pc:spChg chg="mod">
+          <ac:chgData name="Felix Gervasi" userId="af4e32ee5822202e" providerId="LiveId" clId="{B1AFB909-1AD8-4EC8-A985-718099B00839}" dt="2023-01-16T13:21:30.548" v="0" actId="1076"/>
+          <ac:spMkLst>
+            <pc:docMk/>
+            <pc:sldMk cId="2703526222" sldId="256"/>
+            <ac:spMk id="8" creationId="{2F9AF3EE-BCD8-2DE6-1DDC-C326D162C93B}"/>
+          </ac:spMkLst>
+        </pc:spChg>
+        <pc:spChg chg="mod">
+          <ac:chgData name="Felix Gervasi" userId="af4e32ee5822202e" providerId="LiveId" clId="{B1AFB909-1AD8-4EC8-A985-718099B00839}" dt="2023-01-16T13:21:30.548" v="0" actId="1076"/>
+          <ac:spMkLst>
+            <pc:docMk/>
+            <pc:sldMk cId="2703526222" sldId="256"/>
+            <ac:spMk id="9" creationId="{7A65BCDB-11A8-DE34-536D-41093F3E66C2}"/>
+          </ac:spMkLst>
+        </pc:spChg>
+      </pc:sldChg>
+      <pc:sldChg chg="addSp delSp modSp mod">
+        <pc:chgData name="Felix Gervasi" userId="af4e32ee5822202e" providerId="LiveId" clId="{B1AFB909-1AD8-4EC8-A985-718099B00839}" dt="2023-01-16T13:31:15.929" v="191" actId="1076"/>
+        <pc:sldMkLst>
+          <pc:docMk/>
+          <pc:sldMk cId="2612705372" sldId="257"/>
+        </pc:sldMkLst>
+        <pc:spChg chg="del">
+          <ac:chgData name="Felix Gervasi" userId="af4e32ee5822202e" providerId="LiveId" clId="{B1AFB909-1AD8-4EC8-A985-718099B00839}" dt="2023-01-16T13:22:33.977" v="34" actId="478"/>
+          <ac:spMkLst>
+            <pc:docMk/>
+            <pc:sldMk cId="2612705372" sldId="257"/>
+            <ac:spMk id="2" creationId="{C2784ACE-61BA-8734-8987-B5739DD1EABE}"/>
+          </ac:spMkLst>
+        </pc:spChg>
+        <pc:spChg chg="del">
+          <ac:chgData name="Felix Gervasi" userId="af4e32ee5822202e" providerId="LiveId" clId="{B1AFB909-1AD8-4EC8-A985-718099B00839}" dt="2023-01-16T13:22:35.407" v="35" actId="478"/>
+          <ac:spMkLst>
+            <pc:docMk/>
+            <pc:sldMk cId="2612705372" sldId="257"/>
+            <ac:spMk id="3" creationId="{1772ABED-A2DA-603C-37B2-D7F00ACD4CA1}"/>
+          </ac:spMkLst>
+        </pc:spChg>
+        <pc:spChg chg="add del mod">
+          <ac:chgData name="Felix Gervasi" userId="af4e32ee5822202e" providerId="LiveId" clId="{B1AFB909-1AD8-4EC8-A985-718099B00839}" dt="2023-01-16T13:22:44.959" v="38"/>
+          <ac:spMkLst>
+            <pc:docMk/>
+            <pc:sldMk cId="2612705372" sldId="257"/>
+            <ac:spMk id="4" creationId="{C21FB3D7-24D3-C636-F7E2-7D0BD7086A31}"/>
+          </ac:spMkLst>
+        </pc:spChg>
+        <pc:spChg chg="add mod">
+          <ac:chgData name="Felix Gervasi" userId="af4e32ee5822202e" providerId="LiveId" clId="{B1AFB909-1AD8-4EC8-A985-718099B00839}" dt="2023-01-16T13:23:14.300" v="52" actId="14100"/>
+          <ac:spMkLst>
+            <pc:docMk/>
+            <pc:sldMk cId="2612705372" sldId="257"/>
+            <ac:spMk id="5" creationId="{B1419B6E-CD72-370D-6E4A-04973FD0BE95}"/>
+          </ac:spMkLst>
+        </pc:spChg>
+        <pc:spChg chg="add mod">
+          <ac:chgData name="Felix Gervasi" userId="af4e32ee5822202e" providerId="LiveId" clId="{B1AFB909-1AD8-4EC8-A985-718099B00839}" dt="2023-01-16T13:23:45.621" v="56" actId="1076"/>
+          <ac:spMkLst>
+            <pc:docMk/>
+            <pc:sldMk cId="2612705372" sldId="257"/>
+            <ac:spMk id="6" creationId="{9958691E-9FBA-0DAC-D814-0C50E7D9A6AE}"/>
+          </ac:spMkLst>
+        </pc:spChg>
+        <pc:spChg chg="add mod">
+          <ac:chgData name="Felix Gervasi" userId="af4e32ee5822202e" providerId="LiveId" clId="{B1AFB909-1AD8-4EC8-A985-718099B00839}" dt="2023-01-16T13:24:41.607" v="99" actId="20577"/>
+          <ac:spMkLst>
+            <pc:docMk/>
+            <pc:sldMk cId="2612705372" sldId="257"/>
+            <ac:spMk id="7" creationId="{147373C4-368C-3D53-EEDC-A2C8D58B9069}"/>
+          </ac:spMkLst>
+        </pc:spChg>
+        <pc:spChg chg="add mod">
+          <ac:chgData name="Felix Gervasi" userId="af4e32ee5822202e" providerId="LiveId" clId="{B1AFB909-1AD8-4EC8-A985-718099B00839}" dt="2023-01-16T13:27:30.458" v="139" actId="255"/>
+          <ac:spMkLst>
+            <pc:docMk/>
+            <pc:sldMk cId="2612705372" sldId="257"/>
+            <ac:spMk id="12" creationId="{52BA15D1-9054-7292-CC65-602A1ADA6667}"/>
+          </ac:spMkLst>
+        </pc:spChg>
+        <pc:spChg chg="add mod">
+          <ac:chgData name="Felix Gervasi" userId="af4e32ee5822202e" providerId="LiveId" clId="{B1AFB909-1AD8-4EC8-A985-718099B00839}" dt="2023-01-16T13:26:14.344" v="129" actId="1076"/>
+          <ac:spMkLst>
+            <pc:docMk/>
+            <pc:sldMk cId="2612705372" sldId="257"/>
+            <ac:spMk id="13" creationId="{19ABB3B5-FFE1-6DC4-F7FE-DAE6B8DE153D}"/>
+          </ac:spMkLst>
+        </pc:spChg>
+        <pc:spChg chg="add mod">
+          <ac:chgData name="Felix Gervasi" userId="af4e32ee5822202e" providerId="LiveId" clId="{B1AFB909-1AD8-4EC8-A985-718099B00839}" dt="2023-01-16T13:26:18.211" v="130" actId="1076"/>
+          <ac:spMkLst>
+            <pc:docMk/>
+            <pc:sldMk cId="2612705372" sldId="257"/>
+            <ac:spMk id="14" creationId="{D820BD80-FCE7-B22A-145F-64417EDD8949}"/>
+          </ac:spMkLst>
+        </pc:spChg>
+        <pc:spChg chg="add mod">
+          <ac:chgData name="Felix Gervasi" userId="af4e32ee5822202e" providerId="LiveId" clId="{B1AFB909-1AD8-4EC8-A985-718099B00839}" dt="2023-01-16T13:26:42.597" v="134" actId="207"/>
+          <ac:spMkLst>
+            <pc:docMk/>
+            <pc:sldMk cId="2612705372" sldId="257"/>
+            <ac:spMk id="15" creationId="{2DA2804B-DBD3-C3C1-9385-DD7D0FC1F04E}"/>
+          </ac:spMkLst>
+        </pc:spChg>
+        <pc:spChg chg="add mod">
+          <ac:chgData name="Felix Gervasi" userId="af4e32ee5822202e" providerId="LiveId" clId="{B1AFB909-1AD8-4EC8-A985-718099B00839}" dt="2023-01-16T13:27:22.705" v="138" actId="1076"/>
+          <ac:spMkLst>
+            <pc:docMk/>
+            <pc:sldMk cId="2612705372" sldId="257"/>
+            <ac:spMk id="16" creationId="{C067105A-BA7E-DA2C-F218-51BAA3E458FF}"/>
+          </ac:spMkLst>
+        </pc:spChg>
+        <pc:spChg chg="add mod">
+          <ac:chgData name="Felix Gervasi" userId="af4e32ee5822202e" providerId="LiveId" clId="{B1AFB909-1AD8-4EC8-A985-718099B00839}" dt="2023-01-16T13:28:40.754" v="142" actId="1076"/>
+          <ac:spMkLst>
+            <pc:docMk/>
+            <pc:sldMk cId="2612705372" sldId="257"/>
+            <ac:spMk id="17" creationId="{644C00A3-2260-FD5C-492F-ECB084F3CE4F}"/>
+          </ac:spMkLst>
+        </pc:spChg>
+        <pc:spChg chg="add mod">
+          <ac:chgData name="Felix Gervasi" userId="af4e32ee5822202e" providerId="LiveId" clId="{B1AFB909-1AD8-4EC8-A985-718099B00839}" dt="2023-01-16T13:30:40.996" v="161" actId="1076"/>
+          <ac:spMkLst>
+            <pc:docMk/>
+            <pc:sldMk cId="2612705372" sldId="257"/>
+            <ac:spMk id="18" creationId="{E2621102-C3F9-061D-22AE-74C1A94B8E16}"/>
+          </ac:spMkLst>
+        </pc:spChg>
+        <pc:spChg chg="add mod">
+          <ac:chgData name="Felix Gervasi" userId="af4e32ee5822202e" providerId="LiveId" clId="{B1AFB909-1AD8-4EC8-A985-718099B00839}" dt="2023-01-16T13:31:15.929" v="191" actId="1076"/>
+          <ac:spMkLst>
+            <pc:docMk/>
+            <pc:sldMk cId="2612705372" sldId="257"/>
+            <ac:spMk id="24" creationId="{14D3F257-0C7D-5DCC-8966-11B5AFB06018}"/>
+          </ac:spMkLst>
+        </pc:spChg>
+        <pc:picChg chg="add mod">
+          <ac:chgData name="Felix Gervasi" userId="af4e32ee5822202e" providerId="LiveId" clId="{B1AFB909-1AD8-4EC8-A985-718099B00839}" dt="2023-01-16T13:30:17.234" v="160" actId="1076"/>
+          <ac:picMkLst>
+            <pc:docMk/>
+            <pc:sldMk cId="2612705372" sldId="257"/>
+            <ac:picMk id="22" creationId="{F692887E-18CB-A1CF-1D81-566629A4D39C}"/>
+          </ac:picMkLst>
+        </pc:picChg>
+        <pc:cxnChg chg="add mod">
+          <ac:chgData name="Felix Gervasi" userId="af4e32ee5822202e" providerId="LiveId" clId="{B1AFB909-1AD8-4EC8-A985-718099B00839}" dt="2023-01-16T13:25:27.696" v="112" actId="14100"/>
+          <ac:cxnSpMkLst>
+            <pc:docMk/>
+            <pc:sldMk cId="2612705372" sldId="257"/>
+            <ac:cxnSpMk id="9" creationId="{FEC8699E-2EAF-0876-D386-DB08BE3F70BB}"/>
+          </ac:cxnSpMkLst>
+        </pc:cxnChg>
+        <pc:cxnChg chg="add mod">
+          <ac:chgData name="Felix Gervasi" userId="af4e32ee5822202e" providerId="LiveId" clId="{B1AFB909-1AD8-4EC8-A985-718099B00839}" dt="2023-01-16T13:29:29.203" v="157" actId="692"/>
+          <ac:cxnSpMkLst>
+            <pc:docMk/>
+            <pc:sldMk cId="2612705372" sldId="257"/>
+            <ac:cxnSpMk id="20" creationId="{53BD098D-B4E9-48CB-FF59-6653CE3776BF}"/>
+          </ac:cxnSpMkLst>
+        </pc:cxnChg>
+        <pc:cxnChg chg="add mod">
+          <ac:chgData name="Felix Gervasi" userId="af4e32ee5822202e" providerId="LiveId" clId="{B1AFB909-1AD8-4EC8-A985-718099B00839}" dt="2023-01-16T13:30:52.391" v="163" actId="1076"/>
+          <ac:cxnSpMkLst>
+            <pc:docMk/>
+            <pc:sldMk cId="2612705372" sldId="257"/>
+            <ac:cxnSpMk id="23" creationId="{6355B8E6-0938-F7FC-DF7E-AFA6DEDC0EDB}"/>
+          </ac:cxnSpMkLst>
+        </pc:cxnChg>
+      </pc:sldChg>
+    </pc:docChg>
+  </pc:docChgLst>
+</pc:chgInfo>
+</file>
+
 <file path=ppt/slideLayouts/slideLayout1.xml><?xml version="1.0" encoding="utf-8"?>
 <p:sldLayout xmlns:a="http://schemas.openxmlformats.org/drawingml/2006/main" xmlns:r="http://schemas.openxmlformats.org/officeDocument/2006/relationships" xmlns:p="http://schemas.openxmlformats.org/presentationml/2006/main" type="title" preserve="1">
   <p:cSld name="Titelfolie">
@@ -271,7 +499,7 @@
           <a:p>
             <a:fld id="{E71C9A88-5756-4A2C-876B-8A0B6101B8C4}" type="datetimeFigureOut">
               <a:rPr lang="de-DE" smtClean="0"/>
-              <a:t>14.01.2023</a:t>
+              <a:t>16.01.2023</a:t>
             </a:fld>
             <a:endParaRPr lang="de-DE"/>
           </a:p>
@@ -469,7 +697,7 @@
           <a:p>
             <a:fld id="{E71C9A88-5756-4A2C-876B-8A0B6101B8C4}" type="datetimeFigureOut">
               <a:rPr lang="de-DE" smtClean="0"/>
-              <a:t>14.01.2023</a:t>
+              <a:t>16.01.2023</a:t>
             </a:fld>
             <a:endParaRPr lang="de-DE"/>
           </a:p>
@@ -677,7 +905,7 @@
           <a:p>
             <a:fld id="{E71C9A88-5756-4A2C-876B-8A0B6101B8C4}" type="datetimeFigureOut">
               <a:rPr lang="de-DE" smtClean="0"/>
-              <a:t>14.01.2023</a:t>
+              <a:t>16.01.2023</a:t>
             </a:fld>
             <a:endParaRPr lang="de-DE"/>
           </a:p>
@@ -875,7 +1103,7 @@
           <a:p>
             <a:fld id="{E71C9A88-5756-4A2C-876B-8A0B6101B8C4}" type="datetimeFigureOut">
               <a:rPr lang="de-DE" smtClean="0"/>
-              <a:t>14.01.2023</a:t>
+              <a:t>16.01.2023</a:t>
             </a:fld>
             <a:endParaRPr lang="de-DE"/>
           </a:p>
@@ -1150,7 +1378,7 @@
           <a:p>
             <a:fld id="{E71C9A88-5756-4A2C-876B-8A0B6101B8C4}" type="datetimeFigureOut">
               <a:rPr lang="de-DE" smtClean="0"/>
-              <a:t>14.01.2023</a:t>
+              <a:t>16.01.2023</a:t>
             </a:fld>
             <a:endParaRPr lang="de-DE"/>
           </a:p>
@@ -1415,7 +1643,7 @@
           <a:p>
             <a:fld id="{E71C9A88-5756-4A2C-876B-8A0B6101B8C4}" type="datetimeFigureOut">
               <a:rPr lang="de-DE" smtClean="0"/>
-              <a:t>14.01.2023</a:t>
+              <a:t>16.01.2023</a:t>
             </a:fld>
             <a:endParaRPr lang="de-DE"/>
           </a:p>
@@ -1827,7 +2055,7 @@
           <a:p>
             <a:fld id="{E71C9A88-5756-4A2C-876B-8A0B6101B8C4}" type="datetimeFigureOut">
               <a:rPr lang="de-DE" smtClean="0"/>
-              <a:t>14.01.2023</a:t>
+              <a:t>16.01.2023</a:t>
             </a:fld>
             <a:endParaRPr lang="de-DE"/>
           </a:p>
@@ -1968,7 +2196,7 @@
           <a:p>
             <a:fld id="{E71C9A88-5756-4A2C-876B-8A0B6101B8C4}" type="datetimeFigureOut">
               <a:rPr lang="de-DE" smtClean="0"/>
-              <a:t>14.01.2023</a:t>
+              <a:t>16.01.2023</a:t>
             </a:fld>
             <a:endParaRPr lang="de-DE"/>
           </a:p>
@@ -2081,7 +2309,7 @@
           <a:p>
             <a:fld id="{E71C9A88-5756-4A2C-876B-8A0B6101B8C4}" type="datetimeFigureOut">
               <a:rPr lang="de-DE" smtClean="0"/>
-              <a:t>14.01.2023</a:t>
+              <a:t>16.01.2023</a:t>
             </a:fld>
             <a:endParaRPr lang="de-DE"/>
           </a:p>
@@ -2392,7 +2620,7 @@
           <a:p>
             <a:fld id="{E71C9A88-5756-4A2C-876B-8A0B6101B8C4}" type="datetimeFigureOut">
               <a:rPr lang="de-DE" smtClean="0"/>
-              <a:t>14.01.2023</a:t>
+              <a:t>16.01.2023</a:t>
             </a:fld>
             <a:endParaRPr lang="de-DE"/>
           </a:p>
@@ -2680,7 +2908,7 @@
           <a:p>
             <a:fld id="{E71C9A88-5756-4A2C-876B-8A0B6101B8C4}" type="datetimeFigureOut">
               <a:rPr lang="de-DE" smtClean="0"/>
-              <a:t>14.01.2023</a:t>
+              <a:t>16.01.2023</a:t>
             </a:fld>
             <a:endParaRPr lang="de-DE"/>
           </a:p>
@@ -2921,7 +3149,7 @@
           <a:p>
             <a:fld id="{E71C9A88-5756-4A2C-876B-8A0B6101B8C4}" type="datetimeFigureOut">
               <a:rPr lang="de-DE" smtClean="0"/>
-              <a:t>14.01.2023</a:t>
+              <a:t>16.01.2023</a:t>
             </a:fld>
             <a:endParaRPr lang="de-DE"/>
           </a:p>
@@ -3389,7 +3617,7 @@
         </p:nvSpPr>
         <p:spPr>
           <a:xfrm>
-            <a:off x="4866097" y="2794570"/>
+            <a:off x="4907194" y="2233000"/>
             <a:ext cx="2496620" cy="323636"/>
           </a:xfrm>
           <a:prstGeom prst="rect">
@@ -3436,7 +3664,7 @@
         </p:nvSpPr>
         <p:spPr>
           <a:xfrm>
-            <a:off x="4866097" y="2425238"/>
+            <a:off x="4907194" y="1863668"/>
             <a:ext cx="780983" cy="369332"/>
           </a:xfrm>
           <a:prstGeom prst="rect">
@@ -3471,7 +3699,7 @@
         </p:nvSpPr>
         <p:spPr>
           <a:xfrm>
-            <a:off x="4866097" y="3989687"/>
+            <a:off x="4907194" y="3428117"/>
             <a:ext cx="2496620" cy="323636"/>
           </a:xfrm>
           <a:prstGeom prst="rect">
@@ -3518,7 +3746,7 @@
         </p:nvSpPr>
         <p:spPr>
           <a:xfrm>
-            <a:off x="4866097" y="3620355"/>
+            <a:off x="4907194" y="3058785"/>
             <a:ext cx="1070999" cy="369332"/>
           </a:xfrm>
           <a:prstGeom prst="rect">
@@ -3649,6 +3877,108 @@
             <a:r>
               <a:rPr lang="de-DE" sz="3200" dirty="0"/>
               <a:t>Start</a:t>
+            </a:r>
+          </a:p>
+        </p:txBody>
+      </p:sp>
+      <p:sp>
+        <p:nvSpPr>
+          <p:cNvPr id="2" name="Rechteck 1">
+            <a:extLst>
+              <a:ext uri="{FF2B5EF4-FFF2-40B4-BE49-F238E27FC236}">
+                <a16:creationId xmlns:a16="http://schemas.microsoft.com/office/drawing/2014/main" id="{535A1B05-2131-54AC-5ACF-DD7AB03D58A2}"/>
+              </a:ext>
+            </a:extLst>
+          </p:cNvPr>
+          <p:cNvSpPr/>
+          <p:nvPr/>
+        </p:nvSpPr>
+        <p:spPr>
+          <a:xfrm>
+            <a:off x="4932311" y="4509876"/>
+            <a:ext cx="2120898" cy="431514"/>
+          </a:xfrm>
+          <a:prstGeom prst="rect">
+            <a:avLst/>
+          </a:prstGeom>
+        </p:spPr>
+        <p:style>
+          <a:lnRef idx="2">
+            <a:schemeClr val="accent1">
+              <a:shade val="50000"/>
+            </a:schemeClr>
+          </a:lnRef>
+          <a:fillRef idx="1">
+            <a:schemeClr val="accent1"/>
+          </a:fillRef>
+          <a:effectRef idx="0">
+            <a:schemeClr val="accent1"/>
+          </a:effectRef>
+          <a:fontRef idx="minor">
+            <a:schemeClr val="lt1"/>
+          </a:fontRef>
+        </p:style>
+        <p:txBody>
+          <a:bodyPr rtlCol="0" anchor="ctr"/>
+          <a:lstStyle/>
+          <a:p>
+            <a:pPr algn="ctr"/>
+            <a:endParaRPr lang="de-DE"/>
+          </a:p>
+        </p:txBody>
+      </p:sp>
+      <p:sp>
+        <p:nvSpPr>
+          <p:cNvPr id="3" name="Textfeld 2">
+            <a:extLst>
+              <a:ext uri="{FF2B5EF4-FFF2-40B4-BE49-F238E27FC236}">
+                <a16:creationId xmlns:a16="http://schemas.microsoft.com/office/drawing/2014/main" id="{B1B5887A-B30F-5227-8A15-B56921457587}"/>
+              </a:ext>
+            </a:extLst>
+          </p:cNvPr>
+          <p:cNvSpPr txBox="1"/>
+          <p:nvPr/>
+        </p:nvSpPr>
+        <p:spPr>
+          <a:xfrm>
+            <a:off x="4932311" y="4540967"/>
+            <a:ext cx="2198669" cy="369332"/>
+          </a:xfrm>
+          <a:prstGeom prst="rect">
+            <a:avLst/>
+          </a:prstGeom>
+          <a:noFill/>
+        </p:spPr>
+        <p:txBody>
+          <a:bodyPr wrap="square" rtlCol="0">
+            <a:spAutoFit/>
+          </a:bodyPr>
+          <a:lstStyle/>
+          <a:p>
+            <a:pPr algn="ctr"/>
+            <a:r>
+              <a:rPr lang="de-DE" dirty="0">
+                <a:solidFill>
+                  <a:schemeClr val="bg1"/>
+                </a:solidFill>
+              </a:rPr>
+              <a:t>Login </a:t>
+            </a:r>
+            <a:r>
+              <a:rPr lang="de-DE" dirty="0" err="1">
+                <a:solidFill>
+                  <a:schemeClr val="bg1"/>
+                </a:solidFill>
+              </a:rPr>
+              <a:t>or</a:t>
+            </a:r>
+            <a:r>
+              <a:rPr lang="de-DE" dirty="0">
+                <a:solidFill>
+                  <a:schemeClr val="bg1"/>
+                </a:solidFill>
+              </a:rPr>
+              <a:t> Register</a:t>
             </a:r>
           </a:p>
         </p:txBody>
@@ -3685,51 +4015,603 @@
       </p:grpSpPr>
       <p:sp>
         <p:nvSpPr>
-          <p:cNvPr id="2" name="Titel 1">
-            <a:extLst>
-              <a:ext uri="{FF2B5EF4-FFF2-40B4-BE49-F238E27FC236}">
-                <a16:creationId xmlns:a16="http://schemas.microsoft.com/office/drawing/2014/main" id="{C2784ACE-61BA-8734-8987-B5739DD1EABE}"/>
-              </a:ext>
-            </a:extLst>
-          </p:cNvPr>
-          <p:cNvSpPr>
-            <a:spLocks noGrp="1"/>
-          </p:cNvSpPr>
-          <p:nvPr>
-            <p:ph type="title"/>
-          </p:nvPr>
-        </p:nvSpPr>
-        <p:spPr/>
-        <p:txBody>
-          <a:bodyPr/>
-          <a:lstStyle/>
-          <a:p>
+          <p:cNvPr id="5" name="Textfeld 4">
+            <a:extLst>
+              <a:ext uri="{FF2B5EF4-FFF2-40B4-BE49-F238E27FC236}">
+                <a16:creationId xmlns:a16="http://schemas.microsoft.com/office/drawing/2014/main" id="{B1419B6E-CD72-370D-6E4A-04973FD0BE95}"/>
+              </a:ext>
+            </a:extLst>
+          </p:cNvPr>
+          <p:cNvSpPr txBox="1"/>
+          <p:nvPr/>
+        </p:nvSpPr>
+        <p:spPr>
+          <a:xfrm>
+            <a:off x="0" y="0"/>
+            <a:ext cx="1813389" cy="584775"/>
+          </a:xfrm>
+          <a:prstGeom prst="rect">
+            <a:avLst/>
+          </a:prstGeom>
+          <a:noFill/>
+        </p:spPr>
+        <p:txBody>
+          <a:bodyPr wrap="square" rtlCol="0">
+            <a:spAutoFit/>
+          </a:bodyPr>
+          <a:lstStyle/>
+          <a:p>
+            <a:r>
+              <a:rPr lang="de-DE" sz="3200" dirty="0"/>
+              <a:t>List View</a:t>
+            </a:r>
+          </a:p>
+        </p:txBody>
+      </p:sp>
+      <p:sp>
+        <p:nvSpPr>
+          <p:cNvPr id="6" name="Rechteck 5">
+            <a:extLst>
+              <a:ext uri="{FF2B5EF4-FFF2-40B4-BE49-F238E27FC236}">
+                <a16:creationId xmlns:a16="http://schemas.microsoft.com/office/drawing/2014/main" id="{9958691E-9FBA-0DAC-D814-0C50E7D9A6AE}"/>
+              </a:ext>
+            </a:extLst>
+          </p:cNvPr>
+          <p:cNvSpPr/>
+          <p:nvPr/>
+        </p:nvSpPr>
+        <p:spPr>
+          <a:xfrm>
+            <a:off x="0" y="724328"/>
+            <a:ext cx="2856215" cy="6133672"/>
+          </a:xfrm>
+          <a:prstGeom prst="rect">
+            <a:avLst/>
+          </a:prstGeom>
+          <a:noFill/>
+        </p:spPr>
+        <p:style>
+          <a:lnRef idx="2">
+            <a:schemeClr val="accent1">
+              <a:shade val="50000"/>
+            </a:schemeClr>
+          </a:lnRef>
+          <a:fillRef idx="1">
+            <a:schemeClr val="accent1"/>
+          </a:fillRef>
+          <a:effectRef idx="0">
+            <a:schemeClr val="accent1"/>
+          </a:effectRef>
+          <a:fontRef idx="minor">
+            <a:schemeClr val="lt1"/>
+          </a:fontRef>
+        </p:style>
+        <p:txBody>
+          <a:bodyPr rtlCol="0" anchor="ctr"/>
+          <a:lstStyle/>
+          <a:p>
+            <a:pPr algn="ctr"/>
             <a:endParaRPr lang="de-DE"/>
           </a:p>
         </p:txBody>
       </p:sp>
       <p:sp>
         <p:nvSpPr>
-          <p:cNvPr id="3" name="Inhaltsplatzhalter 2">
-            <a:extLst>
-              <a:ext uri="{FF2B5EF4-FFF2-40B4-BE49-F238E27FC236}">
-                <a16:creationId xmlns:a16="http://schemas.microsoft.com/office/drawing/2014/main" id="{1772ABED-A2DA-603C-37B2-D7F00ACD4CA1}"/>
-              </a:ext>
-            </a:extLst>
-          </p:cNvPr>
-          <p:cNvSpPr>
-            <a:spLocks noGrp="1"/>
-          </p:cNvSpPr>
-          <p:nvPr>
-            <p:ph idx="1"/>
-          </p:nvPr>
-        </p:nvSpPr>
-        <p:spPr/>
-        <p:txBody>
-          <a:bodyPr/>
-          <a:lstStyle/>
-          <a:p>
+          <p:cNvPr id="7" name="Textfeld 6">
+            <a:extLst>
+              <a:ext uri="{FF2B5EF4-FFF2-40B4-BE49-F238E27FC236}">
+                <a16:creationId xmlns:a16="http://schemas.microsoft.com/office/drawing/2014/main" id="{147373C4-368C-3D53-EEDC-A2C8D58B9069}"/>
+              </a:ext>
+            </a:extLst>
+          </p:cNvPr>
+          <p:cNvSpPr txBox="1"/>
+          <p:nvPr/>
+        </p:nvSpPr>
+        <p:spPr>
+          <a:xfrm>
+            <a:off x="51370" y="765425"/>
+            <a:ext cx="2804845" cy="646331"/>
+          </a:xfrm>
+          <a:prstGeom prst="rect">
+            <a:avLst/>
+          </a:prstGeom>
+          <a:noFill/>
+        </p:spPr>
+        <p:txBody>
+          <a:bodyPr wrap="square" rtlCol="0">
+            <a:spAutoFit/>
+          </a:bodyPr>
+          <a:lstStyle/>
+          <a:p>
+            <a:r>
+              <a:rPr lang="de-DE" dirty="0" err="1"/>
+              <a:t>Logged</a:t>
+            </a:r>
+            <a:r>
+              <a:rPr lang="de-DE" dirty="0"/>
+              <a:t> in </a:t>
+            </a:r>
+            <a:r>
+              <a:rPr lang="de-DE" dirty="0" err="1"/>
+              <a:t>as</a:t>
+            </a:r>
+            <a:r>
+              <a:rPr lang="de-DE" dirty="0"/>
+              <a:t> &lt;</a:t>
+            </a:r>
+            <a:r>
+              <a:rPr lang="de-DE" dirty="0" err="1"/>
+              <a:t>username</a:t>
+            </a:r>
+            <a:r>
+              <a:rPr lang="de-DE" dirty="0"/>
+              <a:t>&gt; (&lt;mail&gt;)</a:t>
+            </a:r>
+          </a:p>
+        </p:txBody>
+      </p:sp>
+      <p:cxnSp>
+        <p:nvCxnSpPr>
+          <p:cNvPr id="9" name="Gerader Verbinder 8">
+            <a:extLst>
+              <a:ext uri="{FF2B5EF4-FFF2-40B4-BE49-F238E27FC236}">
+                <a16:creationId xmlns:a16="http://schemas.microsoft.com/office/drawing/2014/main" id="{FEC8699E-2EAF-0876-D386-DB08BE3F70BB}"/>
+              </a:ext>
+            </a:extLst>
+          </p:cNvPr>
+          <p:cNvCxnSpPr>
+            <a:cxnSpLocks/>
+          </p:cNvCxnSpPr>
+          <p:nvPr/>
+        </p:nvCxnSpPr>
+        <p:spPr>
+          <a:xfrm>
+            <a:off x="25685" y="1628454"/>
+            <a:ext cx="2830530" cy="0"/>
+          </a:xfrm>
+          <a:prstGeom prst="line">
+            <a:avLst/>
+          </a:prstGeom>
+          <a:ln w="25400"/>
+        </p:spPr>
+        <p:style>
+          <a:lnRef idx="1">
+            <a:schemeClr val="accent1"/>
+          </a:lnRef>
+          <a:fillRef idx="0">
+            <a:schemeClr val="accent1"/>
+          </a:fillRef>
+          <a:effectRef idx="0">
+            <a:schemeClr val="accent1"/>
+          </a:effectRef>
+          <a:fontRef idx="minor">
+            <a:schemeClr val="tx1"/>
+          </a:fontRef>
+        </p:style>
+      </p:cxnSp>
+      <p:sp>
+        <p:nvSpPr>
+          <p:cNvPr id="12" name="Textfeld 11">
+            <a:extLst>
+              <a:ext uri="{FF2B5EF4-FFF2-40B4-BE49-F238E27FC236}">
+                <a16:creationId xmlns:a16="http://schemas.microsoft.com/office/drawing/2014/main" id="{52BA15D1-9054-7292-CC65-602A1ADA6667}"/>
+              </a:ext>
+            </a:extLst>
+          </p:cNvPr>
+          <p:cNvSpPr txBox="1"/>
+          <p:nvPr/>
+        </p:nvSpPr>
+        <p:spPr>
+          <a:xfrm>
+            <a:off x="2856215" y="719258"/>
+            <a:ext cx="760288" cy="461665"/>
+          </a:xfrm>
+          <a:prstGeom prst="rect">
+            <a:avLst/>
+          </a:prstGeom>
+          <a:noFill/>
+        </p:spPr>
+        <p:txBody>
+          <a:bodyPr wrap="square" rtlCol="0">
+            <a:spAutoFit/>
+          </a:bodyPr>
+          <a:lstStyle/>
+          <a:p>
+            <a:r>
+              <a:rPr lang="de-DE" sz="2400" dirty="0"/>
+              <a:t>List1</a:t>
+            </a:r>
+          </a:p>
+        </p:txBody>
+      </p:sp>
+      <p:sp>
+        <p:nvSpPr>
+          <p:cNvPr id="13" name="Textfeld 12">
+            <a:extLst>
+              <a:ext uri="{FF2B5EF4-FFF2-40B4-BE49-F238E27FC236}">
+                <a16:creationId xmlns:a16="http://schemas.microsoft.com/office/drawing/2014/main" id="{19ABB3B5-FFE1-6DC4-F7FE-DAE6B8DE153D}"/>
+              </a:ext>
+            </a:extLst>
+          </p:cNvPr>
+          <p:cNvSpPr txBox="1"/>
+          <p:nvPr/>
+        </p:nvSpPr>
+        <p:spPr>
+          <a:xfrm>
+            <a:off x="-56508" y="2050229"/>
+            <a:ext cx="760288" cy="369332"/>
+          </a:xfrm>
+          <a:prstGeom prst="rect">
+            <a:avLst/>
+          </a:prstGeom>
+          <a:noFill/>
+        </p:spPr>
+        <p:txBody>
+          <a:bodyPr wrap="square" rtlCol="0">
+            <a:spAutoFit/>
+          </a:bodyPr>
+          <a:lstStyle/>
+          <a:p>
+            <a:r>
+              <a:rPr lang="de-DE" dirty="0"/>
+              <a:t>List2</a:t>
+            </a:r>
+          </a:p>
+        </p:txBody>
+      </p:sp>
+      <p:sp>
+        <p:nvSpPr>
+          <p:cNvPr id="14" name="Textfeld 13">
+            <a:extLst>
+              <a:ext uri="{FF2B5EF4-FFF2-40B4-BE49-F238E27FC236}">
+                <a16:creationId xmlns:a16="http://schemas.microsoft.com/office/drawing/2014/main" id="{D820BD80-FCE7-B22A-145F-64417EDD8949}"/>
+              </a:ext>
+            </a:extLst>
+          </p:cNvPr>
+          <p:cNvSpPr txBox="1"/>
+          <p:nvPr/>
+        </p:nvSpPr>
+        <p:spPr>
+          <a:xfrm>
+            <a:off x="-56508" y="2419561"/>
+            <a:ext cx="760288" cy="369332"/>
+          </a:xfrm>
+          <a:prstGeom prst="rect">
+            <a:avLst/>
+          </a:prstGeom>
+          <a:noFill/>
+        </p:spPr>
+        <p:txBody>
+          <a:bodyPr wrap="square" rtlCol="0">
+            <a:spAutoFit/>
+          </a:bodyPr>
+          <a:lstStyle/>
+          <a:p>
+            <a:r>
+              <a:rPr lang="de-DE" dirty="0"/>
+              <a:t>List3</a:t>
+            </a:r>
+          </a:p>
+        </p:txBody>
+      </p:sp>
+      <p:sp>
+        <p:nvSpPr>
+          <p:cNvPr id="15" name="Rechteck 14">
+            <a:extLst>
+              <a:ext uri="{FF2B5EF4-FFF2-40B4-BE49-F238E27FC236}">
+                <a16:creationId xmlns:a16="http://schemas.microsoft.com/office/drawing/2014/main" id="{2DA2804B-DBD3-C3C1-9385-DD7D0FC1F04E}"/>
+              </a:ext>
+            </a:extLst>
+          </p:cNvPr>
+          <p:cNvSpPr/>
+          <p:nvPr/>
+        </p:nvSpPr>
+        <p:spPr>
+          <a:xfrm>
+            <a:off x="2856215" y="724328"/>
+            <a:ext cx="7690207" cy="6133672"/>
+          </a:xfrm>
+          <a:prstGeom prst="rect">
+            <a:avLst/>
+          </a:prstGeom>
+          <a:noFill/>
+        </p:spPr>
+        <p:style>
+          <a:lnRef idx="2">
+            <a:schemeClr val="accent1">
+              <a:shade val="50000"/>
+            </a:schemeClr>
+          </a:lnRef>
+          <a:fillRef idx="1">
+            <a:schemeClr val="accent1"/>
+          </a:fillRef>
+          <a:effectRef idx="0">
+            <a:schemeClr val="accent1"/>
+          </a:effectRef>
+          <a:fontRef idx="minor">
+            <a:schemeClr val="lt1"/>
+          </a:fontRef>
+        </p:style>
+        <p:txBody>
+          <a:bodyPr rtlCol="0" anchor="ctr"/>
+          <a:lstStyle/>
+          <a:p>
+            <a:pPr algn="ctr"/>
             <a:endParaRPr lang="de-DE"/>
+          </a:p>
+        </p:txBody>
+      </p:sp>
+      <p:sp>
+        <p:nvSpPr>
+          <p:cNvPr id="16" name="Textfeld 15">
+            <a:extLst>
+              <a:ext uri="{FF2B5EF4-FFF2-40B4-BE49-F238E27FC236}">
+                <a16:creationId xmlns:a16="http://schemas.microsoft.com/office/drawing/2014/main" id="{C067105A-BA7E-DA2C-F218-51BAA3E458FF}"/>
+              </a:ext>
+            </a:extLst>
+          </p:cNvPr>
+          <p:cNvSpPr txBox="1"/>
+          <p:nvPr/>
+        </p:nvSpPr>
+        <p:spPr>
+          <a:xfrm>
+            <a:off x="-56508" y="1683844"/>
+            <a:ext cx="760288" cy="369332"/>
+          </a:xfrm>
+          <a:prstGeom prst="rect">
+            <a:avLst/>
+          </a:prstGeom>
+          <a:noFill/>
+        </p:spPr>
+        <p:txBody>
+          <a:bodyPr wrap="square" rtlCol="0">
+            <a:spAutoFit/>
+          </a:bodyPr>
+          <a:lstStyle/>
+          <a:p>
+            <a:r>
+              <a:rPr lang="de-DE" dirty="0"/>
+              <a:t>List1</a:t>
+            </a:r>
+          </a:p>
+        </p:txBody>
+      </p:sp>
+      <p:sp>
+        <p:nvSpPr>
+          <p:cNvPr id="17" name="Rechteck 16">
+            <a:extLst>
+              <a:ext uri="{FF2B5EF4-FFF2-40B4-BE49-F238E27FC236}">
+                <a16:creationId xmlns:a16="http://schemas.microsoft.com/office/drawing/2014/main" id="{644C00A3-2260-FD5C-492F-ECB084F3CE4F}"/>
+              </a:ext>
+            </a:extLst>
+          </p:cNvPr>
+          <p:cNvSpPr/>
+          <p:nvPr/>
+        </p:nvSpPr>
+        <p:spPr>
+          <a:xfrm>
+            <a:off x="3236359" y="1683844"/>
+            <a:ext cx="5183313" cy="595901"/>
+          </a:xfrm>
+          <a:prstGeom prst="rect">
+            <a:avLst/>
+          </a:prstGeom>
+          <a:noFill/>
+        </p:spPr>
+        <p:style>
+          <a:lnRef idx="2">
+            <a:schemeClr val="accent1">
+              <a:shade val="50000"/>
+            </a:schemeClr>
+          </a:lnRef>
+          <a:fillRef idx="1">
+            <a:schemeClr val="accent1"/>
+          </a:fillRef>
+          <a:effectRef idx="0">
+            <a:schemeClr val="accent1"/>
+          </a:effectRef>
+          <a:fontRef idx="minor">
+            <a:schemeClr val="lt1"/>
+          </a:fontRef>
+        </p:style>
+        <p:txBody>
+          <a:bodyPr rtlCol="0" anchor="ctr"/>
+          <a:lstStyle/>
+          <a:p>
+            <a:pPr algn="ctr"/>
+            <a:endParaRPr lang="de-DE"/>
+          </a:p>
+        </p:txBody>
+      </p:sp>
+      <p:sp>
+        <p:nvSpPr>
+          <p:cNvPr id="18" name="Textfeld 17">
+            <a:extLst>
+              <a:ext uri="{FF2B5EF4-FFF2-40B4-BE49-F238E27FC236}">
+                <a16:creationId xmlns:a16="http://schemas.microsoft.com/office/drawing/2014/main" id="{E2621102-C3F9-061D-22AE-74C1A94B8E16}"/>
+              </a:ext>
+            </a:extLst>
+          </p:cNvPr>
+          <p:cNvSpPr txBox="1"/>
+          <p:nvPr/>
+        </p:nvSpPr>
+        <p:spPr>
+          <a:xfrm>
+            <a:off x="4255302" y="1797127"/>
+            <a:ext cx="753348" cy="369332"/>
+          </a:xfrm>
+          <a:prstGeom prst="rect">
+            <a:avLst/>
+          </a:prstGeom>
+          <a:noFill/>
+        </p:spPr>
+        <p:txBody>
+          <a:bodyPr wrap="none" rtlCol="0">
+            <a:spAutoFit/>
+          </a:bodyPr>
+          <a:lstStyle/>
+          <a:p>
+            <a:r>
+              <a:rPr lang="de-DE" dirty="0"/>
+              <a:t>Task 1</a:t>
+            </a:r>
+          </a:p>
+        </p:txBody>
+      </p:sp>
+      <p:cxnSp>
+        <p:nvCxnSpPr>
+          <p:cNvPr id="20" name="Gerader Verbinder 19">
+            <a:extLst>
+              <a:ext uri="{FF2B5EF4-FFF2-40B4-BE49-F238E27FC236}">
+                <a16:creationId xmlns:a16="http://schemas.microsoft.com/office/drawing/2014/main" id="{53BD098D-B4E9-48CB-FF59-6653CE3776BF}"/>
+              </a:ext>
+            </a:extLst>
+          </p:cNvPr>
+          <p:cNvCxnSpPr/>
+          <p:nvPr/>
+        </p:nvCxnSpPr>
+        <p:spPr>
+          <a:xfrm>
+            <a:off x="3827124" y="1683844"/>
+            <a:ext cx="0" cy="595901"/>
+          </a:xfrm>
+          <a:prstGeom prst="line">
+            <a:avLst/>
+          </a:prstGeom>
+          <a:ln w="25400"/>
+        </p:spPr>
+        <p:style>
+          <a:lnRef idx="1">
+            <a:schemeClr val="accent1"/>
+          </a:lnRef>
+          <a:fillRef idx="0">
+            <a:schemeClr val="accent1"/>
+          </a:fillRef>
+          <a:effectRef idx="0">
+            <a:schemeClr val="accent1"/>
+          </a:effectRef>
+          <a:fontRef idx="minor">
+            <a:schemeClr val="tx1"/>
+          </a:fontRef>
+        </p:style>
+      </p:cxnSp>
+      <p:pic>
+        <p:nvPicPr>
+          <p:cNvPr id="22" name="Grafik 21" descr="Häkchen mit einfarbiger Füllung">
+            <a:extLst>
+              <a:ext uri="{FF2B5EF4-FFF2-40B4-BE49-F238E27FC236}">
+                <a16:creationId xmlns:a16="http://schemas.microsoft.com/office/drawing/2014/main" id="{F692887E-18CB-A1CF-1D81-566629A4D39C}"/>
+              </a:ext>
+            </a:extLst>
+          </p:cNvPr>
+          <p:cNvPicPr>
+            <a:picLocks noChangeAspect="1"/>
+          </p:cNvPicPr>
+          <p:nvPr/>
+        </p:nvPicPr>
+        <p:blipFill>
+          <a:blip r:embed="rId2">
+            <a:extLst>
+              <a:ext uri="{28A0092B-C50C-407E-A947-70E740481C1C}">
+                <a14:useLocalDpi xmlns:a14="http://schemas.microsoft.com/office/drawing/2010/main" val="0"/>
+              </a:ext>
+              <a:ext uri="{96DAC541-7B7A-43D3-8B79-37D633B846F1}">
+                <asvg:svgBlip xmlns:asvg="http://schemas.microsoft.com/office/drawing/2016/SVG/main" r:embed="rId3"/>
+              </a:ext>
+            </a:extLst>
+          </a:blip>
+          <a:stretch>
+            <a:fillRect/>
+          </a:stretch>
+        </p:blipFill>
+        <p:spPr>
+          <a:xfrm>
+            <a:off x="3236359" y="1683843"/>
+            <a:ext cx="595901" cy="595901"/>
+          </a:xfrm>
+          <a:prstGeom prst="rect">
+            <a:avLst/>
+          </a:prstGeom>
+        </p:spPr>
+      </p:pic>
+      <p:cxnSp>
+        <p:nvCxnSpPr>
+          <p:cNvPr id="23" name="Gerader Verbinder 22">
+            <a:extLst>
+              <a:ext uri="{FF2B5EF4-FFF2-40B4-BE49-F238E27FC236}">
+                <a16:creationId xmlns:a16="http://schemas.microsoft.com/office/drawing/2014/main" id="{6355B8E6-0938-F7FC-DF7E-AFA6DEDC0EDB}"/>
+              </a:ext>
+            </a:extLst>
+          </p:cNvPr>
+          <p:cNvCxnSpPr/>
+          <p:nvPr/>
+        </p:nvCxnSpPr>
+        <p:spPr>
+          <a:xfrm>
+            <a:off x="5191874" y="1683843"/>
+            <a:ext cx="0" cy="595901"/>
+          </a:xfrm>
+          <a:prstGeom prst="line">
+            <a:avLst/>
+          </a:prstGeom>
+          <a:ln w="25400"/>
+        </p:spPr>
+        <p:style>
+          <a:lnRef idx="1">
+            <a:schemeClr val="accent1"/>
+          </a:lnRef>
+          <a:fillRef idx="0">
+            <a:schemeClr val="accent1"/>
+          </a:fillRef>
+          <a:effectRef idx="0">
+            <a:schemeClr val="accent1"/>
+          </a:effectRef>
+          <a:fontRef idx="minor">
+            <a:schemeClr val="tx1"/>
+          </a:fontRef>
+        </p:style>
+      </p:cxnSp>
+      <p:sp>
+        <p:nvSpPr>
+          <p:cNvPr id="24" name="Textfeld 23">
+            <a:extLst>
+              <a:ext uri="{FF2B5EF4-FFF2-40B4-BE49-F238E27FC236}">
+                <a16:creationId xmlns:a16="http://schemas.microsoft.com/office/drawing/2014/main" id="{14D3F257-0C7D-5DCC-8966-11B5AFB06018}"/>
+              </a:ext>
+            </a:extLst>
+          </p:cNvPr>
+          <p:cNvSpPr txBox="1"/>
+          <p:nvPr/>
+        </p:nvSpPr>
+        <p:spPr>
+          <a:xfrm>
+            <a:off x="5738113" y="1797127"/>
+            <a:ext cx="2034283" cy="369332"/>
+          </a:xfrm>
+          <a:prstGeom prst="rect">
+            <a:avLst/>
+          </a:prstGeom>
+          <a:noFill/>
+        </p:spPr>
+        <p:txBody>
+          <a:bodyPr wrap="square" rtlCol="0">
+            <a:spAutoFit/>
+          </a:bodyPr>
+          <a:lstStyle/>
+          <a:p>
+            <a:r>
+              <a:rPr lang="de-DE" dirty="0" err="1"/>
+              <a:t>No</a:t>
+            </a:r>
+            <a:r>
+              <a:rPr lang="de-DE" dirty="0"/>
+              <a:t> due date </a:t>
+            </a:r>
+            <a:r>
+              <a:rPr lang="de-DE" dirty="0" err="1"/>
+              <a:t>set</a:t>
+            </a:r>
+            <a:endParaRPr lang="de-DE" dirty="0"/>
           </a:p>
         </p:txBody>
       </p:sp>

</xml_diff>

<commit_message>
fixed hibernate error; add task form opens now when clicking the corresponding button; onAction of the save button almost implemented
</commit_message>
<xml_diff>
--- a/mockup.pptx
+++ b/mockup.pptx
@@ -7,6 +7,7 @@
   <p:sldIdLst>
     <p:sldId id="256" r:id="rId2"/>
     <p:sldId id="257" r:id="rId3"/>
+    <p:sldId id="258" r:id="rId4"/>
   </p:sldIdLst>
   <p:sldSz cx="12192000" cy="6858000"/>
   <p:notesSz cx="6858000" cy="9144000"/>
@@ -127,7 +128,7 @@
 <file path=ppt/revisionInfo.xml><?xml version="1.0" encoding="utf-8"?>
 <p1510:revInfo xmlns:a="http://schemas.openxmlformats.org/drawingml/2006/main" xmlns:r="http://schemas.openxmlformats.org/officeDocument/2006/relationships" xmlns:p1510="http://schemas.microsoft.com/office/powerpoint/2015/10/main">
   <p1510:revLst>
-    <p1510:client id="{B1AFB909-1AD8-4EC8-A985-718099B00839}" v="12" dt="2023-01-16T13:31:01.259"/>
+    <p1510:client id="{B1AFB909-1AD8-4EC8-A985-718099B00839}" v="13" dt="2023-01-25T19:43:27.673"/>
   </p1510:revLst>
 </p1510:revInfo>
 </file>
@@ -136,8 +137,8 @@
 <pc:chgInfo xmlns:a="http://schemas.openxmlformats.org/drawingml/2006/main" xmlns:r="http://schemas.openxmlformats.org/officeDocument/2006/relationships" xmlns:ac="http://schemas.microsoft.com/office/drawing/2013/main/command" xmlns:pc="http://schemas.microsoft.com/office/powerpoint/2013/main/command">
   <pc:docChgLst>
     <pc:chgData name="Felix Gervasi" userId="af4e32ee5822202e" providerId="LiveId" clId="{B1AFB909-1AD8-4EC8-A985-718099B00839}"/>
-    <pc:docChg chg="custSel modSld">
-      <pc:chgData name="Felix Gervasi" userId="af4e32ee5822202e" providerId="LiveId" clId="{B1AFB909-1AD8-4EC8-A985-718099B00839}" dt="2023-01-16T13:31:15.929" v="191" actId="1076"/>
+    <pc:docChg chg="custSel addSld modSld">
+      <pc:chgData name="Felix Gervasi" userId="af4e32ee5822202e" providerId="LiveId" clId="{B1AFB909-1AD8-4EC8-A985-718099B00839}" dt="2023-01-25T19:44:31.365" v="211" actId="1076"/>
       <pc:docMkLst>
         <pc:docMk/>
       </pc:docMkLst>
@@ -347,6 +348,53 @@
           </ac:cxnSpMkLst>
         </pc:cxnChg>
       </pc:sldChg>
+      <pc:sldChg chg="addSp delSp modSp new mod">
+        <pc:chgData name="Felix Gervasi" userId="af4e32ee5822202e" providerId="LiveId" clId="{B1AFB909-1AD8-4EC8-A985-718099B00839}" dt="2023-01-25T19:44:31.365" v="211" actId="1076"/>
+        <pc:sldMkLst>
+          <pc:docMk/>
+          <pc:sldMk cId="3881135259" sldId="258"/>
+        </pc:sldMkLst>
+        <pc:spChg chg="del">
+          <ac:chgData name="Felix Gervasi" userId="af4e32ee5822202e" providerId="LiveId" clId="{B1AFB909-1AD8-4EC8-A985-718099B00839}" dt="2023-01-25T19:43:20.598" v="193" actId="478"/>
+          <ac:spMkLst>
+            <pc:docMk/>
+            <pc:sldMk cId="3881135259" sldId="258"/>
+            <ac:spMk id="2" creationId="{E3487020-77CA-A176-CF80-403B640CD729}"/>
+          </ac:spMkLst>
+        </pc:spChg>
+        <pc:spChg chg="del">
+          <ac:chgData name="Felix Gervasi" userId="af4e32ee5822202e" providerId="LiveId" clId="{B1AFB909-1AD8-4EC8-A985-718099B00839}" dt="2023-01-25T19:43:21.670" v="194" actId="478"/>
+          <ac:spMkLst>
+            <pc:docMk/>
+            <pc:sldMk cId="3881135259" sldId="258"/>
+            <ac:spMk id="3" creationId="{C199F1F7-16FA-313C-68A1-FD5E81ABEC04}"/>
+          </ac:spMkLst>
+        </pc:spChg>
+        <pc:spChg chg="add mod">
+          <ac:chgData name="Felix Gervasi" userId="af4e32ee5822202e" providerId="LiveId" clId="{B1AFB909-1AD8-4EC8-A985-718099B00839}" dt="2023-01-25T19:43:39.327" v="206" actId="1076"/>
+          <ac:spMkLst>
+            <pc:docMk/>
+            <pc:sldMk cId="3881135259" sldId="258"/>
+            <ac:spMk id="4" creationId="{FE6E2181-907F-4C49-E5C5-5A44F776C136}"/>
+          </ac:spMkLst>
+        </pc:spChg>
+        <pc:spChg chg="add mod">
+          <ac:chgData name="Felix Gervasi" userId="af4e32ee5822202e" providerId="LiveId" clId="{B1AFB909-1AD8-4EC8-A985-718099B00839}" dt="2023-01-25T19:44:08.002" v="209" actId="207"/>
+          <ac:spMkLst>
+            <pc:docMk/>
+            <pc:sldMk cId="3881135259" sldId="258"/>
+            <ac:spMk id="5" creationId="{F2E890F5-2C0D-743A-0746-68D8ACB74EC4}"/>
+          </ac:spMkLst>
+        </pc:spChg>
+        <pc:spChg chg="add mod">
+          <ac:chgData name="Felix Gervasi" userId="af4e32ee5822202e" providerId="LiveId" clId="{B1AFB909-1AD8-4EC8-A985-718099B00839}" dt="2023-01-25T19:44:31.365" v="211" actId="1076"/>
+          <ac:spMkLst>
+            <pc:docMk/>
+            <pc:sldMk cId="3881135259" sldId="258"/>
+            <ac:spMk id="6" creationId="{11DB252E-1E17-50BF-410E-C1005C33E059}"/>
+          </ac:spMkLst>
+        </pc:spChg>
+      </pc:sldChg>
     </pc:docChg>
   </pc:docChgLst>
 </pc:chgInfo>
@@ -499,7 +547,7 @@
           <a:p>
             <a:fld id="{E71C9A88-5756-4A2C-876B-8A0B6101B8C4}" type="datetimeFigureOut">
               <a:rPr lang="de-DE" smtClean="0"/>
-              <a:t>16.01.2023</a:t>
+              <a:t>25.01.2023</a:t>
             </a:fld>
             <a:endParaRPr lang="de-DE"/>
           </a:p>
@@ -697,7 +745,7 @@
           <a:p>
             <a:fld id="{E71C9A88-5756-4A2C-876B-8A0B6101B8C4}" type="datetimeFigureOut">
               <a:rPr lang="de-DE" smtClean="0"/>
-              <a:t>16.01.2023</a:t>
+              <a:t>25.01.2023</a:t>
             </a:fld>
             <a:endParaRPr lang="de-DE"/>
           </a:p>
@@ -905,7 +953,7 @@
           <a:p>
             <a:fld id="{E71C9A88-5756-4A2C-876B-8A0B6101B8C4}" type="datetimeFigureOut">
               <a:rPr lang="de-DE" smtClean="0"/>
-              <a:t>16.01.2023</a:t>
+              <a:t>25.01.2023</a:t>
             </a:fld>
             <a:endParaRPr lang="de-DE"/>
           </a:p>
@@ -1103,7 +1151,7 @@
           <a:p>
             <a:fld id="{E71C9A88-5756-4A2C-876B-8A0B6101B8C4}" type="datetimeFigureOut">
               <a:rPr lang="de-DE" smtClean="0"/>
-              <a:t>16.01.2023</a:t>
+              <a:t>25.01.2023</a:t>
             </a:fld>
             <a:endParaRPr lang="de-DE"/>
           </a:p>
@@ -1378,7 +1426,7 @@
           <a:p>
             <a:fld id="{E71C9A88-5756-4A2C-876B-8A0B6101B8C4}" type="datetimeFigureOut">
               <a:rPr lang="de-DE" smtClean="0"/>
-              <a:t>16.01.2023</a:t>
+              <a:t>25.01.2023</a:t>
             </a:fld>
             <a:endParaRPr lang="de-DE"/>
           </a:p>
@@ -1643,7 +1691,7 @@
           <a:p>
             <a:fld id="{E71C9A88-5756-4A2C-876B-8A0B6101B8C4}" type="datetimeFigureOut">
               <a:rPr lang="de-DE" smtClean="0"/>
-              <a:t>16.01.2023</a:t>
+              <a:t>25.01.2023</a:t>
             </a:fld>
             <a:endParaRPr lang="de-DE"/>
           </a:p>
@@ -2055,7 +2103,7 @@
           <a:p>
             <a:fld id="{E71C9A88-5756-4A2C-876B-8A0B6101B8C4}" type="datetimeFigureOut">
               <a:rPr lang="de-DE" smtClean="0"/>
-              <a:t>16.01.2023</a:t>
+              <a:t>25.01.2023</a:t>
             </a:fld>
             <a:endParaRPr lang="de-DE"/>
           </a:p>
@@ -2196,7 +2244,7 @@
           <a:p>
             <a:fld id="{E71C9A88-5756-4A2C-876B-8A0B6101B8C4}" type="datetimeFigureOut">
               <a:rPr lang="de-DE" smtClean="0"/>
-              <a:t>16.01.2023</a:t>
+              <a:t>25.01.2023</a:t>
             </a:fld>
             <a:endParaRPr lang="de-DE"/>
           </a:p>
@@ -2309,7 +2357,7 @@
           <a:p>
             <a:fld id="{E71C9A88-5756-4A2C-876B-8A0B6101B8C4}" type="datetimeFigureOut">
               <a:rPr lang="de-DE" smtClean="0"/>
-              <a:t>16.01.2023</a:t>
+              <a:t>25.01.2023</a:t>
             </a:fld>
             <a:endParaRPr lang="de-DE"/>
           </a:p>
@@ -2620,7 +2668,7 @@
           <a:p>
             <a:fld id="{E71C9A88-5756-4A2C-876B-8A0B6101B8C4}" type="datetimeFigureOut">
               <a:rPr lang="de-DE" smtClean="0"/>
-              <a:t>16.01.2023</a:t>
+              <a:t>25.01.2023</a:t>
             </a:fld>
             <a:endParaRPr lang="de-DE"/>
           </a:p>
@@ -2908,7 +2956,7 @@
           <a:p>
             <a:fld id="{E71C9A88-5756-4A2C-876B-8A0B6101B8C4}" type="datetimeFigureOut">
               <a:rPr lang="de-DE" smtClean="0"/>
-              <a:t>16.01.2023</a:t>
+              <a:t>25.01.2023</a:t>
             </a:fld>
             <a:endParaRPr lang="de-DE"/>
           </a:p>
@@ -3149,7 +3197,7 @@
           <a:p>
             <a:fld id="{E71C9A88-5756-4A2C-876B-8A0B6101B8C4}" type="datetimeFigureOut">
               <a:rPr lang="de-DE" smtClean="0"/>
-              <a:t>16.01.2023</a:t>
+              <a:t>25.01.2023</a:t>
             </a:fld>
             <a:endParaRPr lang="de-DE"/>
           </a:p>
@@ -4628,6 +4676,164 @@
 </p:sld>
 </file>
 
+<file path=ppt/slides/slide3.xml><?xml version="1.0" encoding="utf-8"?>
+<p:sld xmlns:a="http://schemas.openxmlformats.org/drawingml/2006/main" xmlns:r="http://schemas.openxmlformats.org/officeDocument/2006/relationships" xmlns:p="http://schemas.openxmlformats.org/presentationml/2006/main">
+  <p:cSld>
+    <p:spTree>
+      <p:nvGrpSpPr>
+        <p:cNvPr id="1" name=""/>
+        <p:cNvGrpSpPr/>
+        <p:nvPr/>
+      </p:nvGrpSpPr>
+      <p:grpSpPr>
+        <a:xfrm>
+          <a:off x="0" y="0"/>
+          <a:ext cx="0" cy="0"/>
+          <a:chOff x="0" y="0"/>
+          <a:chExt cx="0" cy="0"/>
+        </a:xfrm>
+      </p:grpSpPr>
+      <p:sp>
+        <p:nvSpPr>
+          <p:cNvPr id="4" name="Textfeld 3">
+            <a:extLst>
+              <a:ext uri="{FF2B5EF4-FFF2-40B4-BE49-F238E27FC236}">
+                <a16:creationId xmlns:a16="http://schemas.microsoft.com/office/drawing/2014/main" id="{FE6E2181-907F-4C49-E5C5-5A44F776C136}"/>
+              </a:ext>
+            </a:extLst>
+          </p:cNvPr>
+          <p:cNvSpPr txBox="1"/>
+          <p:nvPr/>
+        </p:nvSpPr>
+        <p:spPr>
+          <a:xfrm flipH="1">
+            <a:off x="0" y="0"/>
+            <a:ext cx="1014985" cy="369332"/>
+          </a:xfrm>
+          <a:prstGeom prst="rect">
+            <a:avLst/>
+          </a:prstGeom>
+          <a:noFill/>
+        </p:spPr>
+        <p:txBody>
+          <a:bodyPr wrap="square" rtlCol="0">
+            <a:spAutoFit/>
+          </a:bodyPr>
+          <a:lstStyle/>
+          <a:p>
+            <a:r>
+              <a:rPr lang="de-DE" dirty="0"/>
+              <a:t>Add Task</a:t>
+            </a:r>
+          </a:p>
+        </p:txBody>
+      </p:sp>
+      <p:sp>
+        <p:nvSpPr>
+          <p:cNvPr id="5" name="Rechteck 4">
+            <a:extLst>
+              <a:ext uri="{FF2B5EF4-FFF2-40B4-BE49-F238E27FC236}">
+                <a16:creationId xmlns:a16="http://schemas.microsoft.com/office/drawing/2014/main" id="{F2E890F5-2C0D-743A-0746-68D8ACB74EC4}"/>
+              </a:ext>
+            </a:extLst>
+          </p:cNvPr>
+          <p:cNvSpPr/>
+          <p:nvPr/>
+        </p:nvSpPr>
+        <p:spPr>
+          <a:xfrm>
+            <a:off x="1865376" y="627888"/>
+            <a:ext cx="8595360" cy="5510784"/>
+          </a:xfrm>
+          <a:prstGeom prst="rect">
+            <a:avLst/>
+          </a:prstGeom>
+          <a:noFill/>
+        </p:spPr>
+        <p:style>
+          <a:lnRef idx="2">
+            <a:schemeClr val="accent1">
+              <a:shade val="50000"/>
+            </a:schemeClr>
+          </a:lnRef>
+          <a:fillRef idx="1">
+            <a:schemeClr val="accent1"/>
+          </a:fillRef>
+          <a:effectRef idx="0">
+            <a:schemeClr val="accent1"/>
+          </a:effectRef>
+          <a:fontRef idx="minor">
+            <a:schemeClr val="lt1"/>
+          </a:fontRef>
+        </p:style>
+        <p:txBody>
+          <a:bodyPr rtlCol="0" anchor="ctr"/>
+          <a:lstStyle/>
+          <a:p>
+            <a:pPr algn="ctr"/>
+            <a:endParaRPr lang="de-DE"/>
+          </a:p>
+        </p:txBody>
+      </p:sp>
+      <p:sp>
+        <p:nvSpPr>
+          <p:cNvPr id="6" name="Rechteck 5">
+            <a:extLst>
+              <a:ext uri="{FF2B5EF4-FFF2-40B4-BE49-F238E27FC236}">
+                <a16:creationId xmlns:a16="http://schemas.microsoft.com/office/drawing/2014/main" id="{11DB252E-1E17-50BF-410E-C1005C33E059}"/>
+              </a:ext>
+            </a:extLst>
+          </p:cNvPr>
+          <p:cNvSpPr/>
+          <p:nvPr/>
+        </p:nvSpPr>
+        <p:spPr>
+          <a:xfrm>
+            <a:off x="3694176" y="1981200"/>
+            <a:ext cx="2328672" cy="304800"/>
+          </a:xfrm>
+          <a:prstGeom prst="rect">
+            <a:avLst/>
+          </a:prstGeom>
+        </p:spPr>
+        <p:style>
+          <a:lnRef idx="2">
+            <a:schemeClr val="accent1">
+              <a:shade val="50000"/>
+            </a:schemeClr>
+          </a:lnRef>
+          <a:fillRef idx="1">
+            <a:schemeClr val="accent1"/>
+          </a:fillRef>
+          <a:effectRef idx="0">
+            <a:schemeClr val="accent1"/>
+          </a:effectRef>
+          <a:fontRef idx="minor">
+            <a:schemeClr val="lt1"/>
+          </a:fontRef>
+        </p:style>
+        <p:txBody>
+          <a:bodyPr rtlCol="0" anchor="ctr"/>
+          <a:lstStyle/>
+          <a:p>
+            <a:pPr algn="ctr"/>
+            <a:endParaRPr lang="de-DE"/>
+          </a:p>
+        </p:txBody>
+      </p:sp>
+    </p:spTree>
+    <p:extLst>
+      <p:ext uri="{BB962C8B-B14F-4D97-AF65-F5344CB8AC3E}">
+        <p14:creationId xmlns:p14="http://schemas.microsoft.com/office/powerpoint/2010/main" val="3881135259"/>
+      </p:ext>
+    </p:extLst>
+  </p:cSld>
+  <p:clrMapOvr>
+    <a:masterClrMapping/>
+  </p:clrMapOvr>
+</p:sld>
+</file>
+
 <file path=ppt/theme/theme1.xml><?xml version="1.0" encoding="utf-8"?>
 <a:theme xmlns:a="http://schemas.openxmlformats.org/drawingml/2006/main" name="Office">
   <a:themeElements>

</xml_diff>